<commit_message>
various workshop updates as well as updates to the DMZ cluster templates added application port allow rules for the backd end subnet and reverse proxy settings
</commit_message>
<xml_diff>
--- a/Presentations/Service Fabric/ServiceFabric Beyond Hello Workshop.pptx
+++ b/Presentations/Service Fabric/ServiceFabric Beyond Hello Workshop.pptx
@@ -302,7 +302,7 @@
               <a:rPr lang="en-US" smtClean="0">
                 <a:latin typeface="Segoe UI" pitchFamily="34" charset="0"/>
               </a:rPr>
-              <a:t>10/19/2016 6:32 PM</a:t>
+              <a:t>10/20/2016 11:44 AM</a:t>
             </a:fld>
             <a:endParaRPr lang="en-US" dirty="0">
               <a:latin typeface="Segoe UI" pitchFamily="34" charset="0"/>
@@ -646,7 +646,7 @@
           <a:p>
             <a:fld id="{38EEC551-8CDA-4EB6-89BB-2A86C9F091C8}" type="datetime8">
               <a:rPr lang="en-US" smtClean="0"/>
-              <a:t>10/19/2016 6:32 PM</a:t>
+              <a:t>10/20/2016 11:44 AM</a:t>
             </a:fld>
             <a:endParaRPr lang="en-US" dirty="0"/>
           </a:p>
@@ -1036,7 +1036,7 @@
           <a:p>
             <a:fld id="{38EEC551-8CDA-4EB6-89BB-2A86C9F091C8}" type="datetime8">
               <a:rPr lang="en-US" smtClean="0"/>
-              <a:t>10/19/2016 6:32 PM</a:t>
+              <a:t>10/20/2016 11:44 AM</a:t>
             </a:fld>
             <a:endParaRPr lang="en-US" dirty="0"/>
           </a:p>
@@ -1125,35 +1125,24 @@
           <a:p>
             <a:r>
               <a:rPr lang="en-US" dirty="0"/>
-              <a:t>Image Courtesy of Brent.</a:t>
+              <a:t>Too many learning</a:t>
             </a:r>
             <a:r>
               <a:rPr lang="en-US" baseline="0" dirty="0"/>
-              <a:t> </a:t>
-            </a:r>
-          </a:p>
-          <a:p>
-            <a:r>
-              <a:rPr lang="en-US" baseline="0" dirty="0"/>
-              <a:t>Purple dye all over his face is courtesy of his daughter</a:t>
-            </a:r>
-          </a:p>
-          <a:p>
-            <a:endParaRPr lang="en-US" baseline="0" dirty="0"/>
-          </a:p>
-          <a:p>
-            <a:endParaRPr lang="en-US" baseline="0" dirty="0"/>
+              <a:t> materials to list here. I’ve put some of my favorites, along with a link to his presentation and some related materials up on GitHub.. Enjoy and check back for updates as things continue to mature. </a:t>
+            </a:r>
+            <a:endParaRPr lang="en-US" dirty="0"/>
           </a:p>
         </p:txBody>
       </p:sp>
       <p:sp>
         <p:nvSpPr>
-          <p:cNvPr id="6" name="Slide Number Placeholder 5"/>
+          <p:cNvPr id="4" name="Slide Number Placeholder 3"/>
           <p:cNvSpPr>
             <a:spLocks noGrp="1"/>
           </p:cNvSpPr>
           <p:nvPr>
-            <p:ph type="sldNum" sz="quarter" idx="12"/>
+            <p:ph type="sldNum" sz="quarter" idx="10"/>
           </p:nvPr>
         </p:nvSpPr>
         <p:spPr/>
@@ -1161,99 +1150,18 @@
           <a:bodyPr/>
           <a:lstStyle/>
           <a:p>
-            <a:fld id="{B4008EB6-D09E-4580-8CD6-DDB14511944F}" type="slidenum">
+            <a:fld id="{EF64FA26-052C-4EE5-A78C-762B03CD0F2A}" type="slidenum">
               <a:rPr lang="en-US" smtClean="0"/>
-              <a:pPr/>
-              <a:t>14</a:t>
+              <a:t>13</a:t>
             </a:fld>
-            <a:endParaRPr lang="en-US" dirty="0"/>
-          </a:p>
-        </p:txBody>
-      </p:sp>
-      <p:sp>
-        <p:nvSpPr>
-          <p:cNvPr id="10" name="Date Placeholder 9"/>
-          <p:cNvSpPr>
-            <a:spLocks noGrp="1"/>
-          </p:cNvSpPr>
-          <p:nvPr>
-            <p:ph type="dt" idx="13"/>
-          </p:nvPr>
-        </p:nvSpPr>
-        <p:spPr/>
-        <p:txBody>
-          <a:bodyPr/>
-          <a:lstStyle/>
-          <a:p>
-            <a:fld id="{6108602D-D426-4C00-B215-BFA18C076426}" type="datetime8">
-              <a:rPr lang="en-US" smtClean="0"/>
-              <a:t>10/19/2016 6:32 PM</a:t>
-            </a:fld>
-            <a:endParaRPr lang="en-US" dirty="0"/>
-          </a:p>
-        </p:txBody>
-      </p:sp>
-      <p:sp>
-        <p:nvSpPr>
-          <p:cNvPr id="4" name="Footer Placeholder 3"/>
-          <p:cNvSpPr>
-            <a:spLocks noGrp="1"/>
-          </p:cNvSpPr>
-          <p:nvPr>
-            <p:ph type="ftr" sz="quarter" idx="14"/>
-          </p:nvPr>
-        </p:nvSpPr>
-        <p:spPr/>
-        <p:txBody>
-          <a:bodyPr/>
-          <a:lstStyle/>
-          <a:p>
-            <a:pPr defTabSz="914099" eaLnBrk="0" hangingPunct="0"/>
-            <a:r>
-              <a:rPr lang="en-US" sz="400" dirty="0">
-                <a:gradFill>
-                  <a:gsLst>
-                    <a:gs pos="0">
-                      <a:prstClr val="black"/>
-                    </a:gs>
-                    <a:gs pos="100000">
-                      <a:prstClr val="black"/>
-                    </a:gs>
-                  </a:gsLst>
-                  <a:lin ang="5400000" scaled="0"/>
-                </a:gradFill>
-                <a:latin typeface="Segoe UI" pitchFamily="34" charset="0"/>
-                <a:ea typeface="Segoe UI" pitchFamily="34" charset="0"/>
-                <a:cs typeface="Segoe UI" pitchFamily="34" charset="0"/>
-              </a:rPr>
-              <a:t>© 2016 Microsoft Corporation. All rights reserved. MICROSOFT MAKES NO WARRANTIES, EXPRESS, IMPLIED OR STATUTORY, AS TO THE INFORMATION IN THIS PRESENTATION.</a:t>
-            </a:r>
-          </a:p>
-        </p:txBody>
-      </p:sp>
-      <p:sp>
-        <p:nvSpPr>
-          <p:cNvPr id="5" name="Header Placeholder 4"/>
-          <p:cNvSpPr>
-            <a:spLocks noGrp="1"/>
-          </p:cNvSpPr>
-          <p:nvPr>
-            <p:ph type="hdr" sz="quarter" idx="15"/>
-          </p:nvPr>
-        </p:nvSpPr>
-        <p:spPr/>
-        <p:txBody>
-          <a:bodyPr/>
-          <a:lstStyle/>
-          <a:p>
-            <a:endParaRPr lang="en-US" dirty="0"/>
+            <a:endParaRPr lang="en-US"/>
           </a:p>
         </p:txBody>
       </p:sp>
     </p:spTree>
     <p:extLst>
       <p:ext uri="{BB962C8B-B14F-4D97-AF65-F5344CB8AC3E}">
-        <p14:creationId xmlns:p14="http://schemas.microsoft.com/office/powerpoint/2010/main" val="613529149"/>
+        <p14:creationId xmlns:p14="http://schemas.microsoft.com/office/powerpoint/2010/main" val="3673557410"/>
       </p:ext>
     </p:extLst>
   </p:cSld>
@@ -1307,6 +1215,190 @@
           <a:bodyPr/>
           <a:lstStyle/>
           <a:p>
+            <a:r>
+              <a:rPr lang="en-US" dirty="0"/>
+              <a:t>Image Courtesy of Brent.</a:t>
+            </a:r>
+            <a:r>
+              <a:rPr lang="en-US" baseline="0" dirty="0"/>
+              <a:t> </a:t>
+            </a:r>
+          </a:p>
+          <a:p>
+            <a:r>
+              <a:rPr lang="en-US" baseline="0" dirty="0"/>
+              <a:t>Purple dye all over his face is courtesy of his daughter</a:t>
+            </a:r>
+          </a:p>
+          <a:p>
+            <a:endParaRPr lang="en-US" baseline="0" dirty="0"/>
+          </a:p>
+          <a:p>
+            <a:endParaRPr lang="en-US" baseline="0" dirty="0"/>
+          </a:p>
+        </p:txBody>
+      </p:sp>
+      <p:sp>
+        <p:nvSpPr>
+          <p:cNvPr id="6" name="Slide Number Placeholder 5"/>
+          <p:cNvSpPr>
+            <a:spLocks noGrp="1"/>
+          </p:cNvSpPr>
+          <p:nvPr>
+            <p:ph type="sldNum" sz="quarter" idx="12"/>
+          </p:nvPr>
+        </p:nvSpPr>
+        <p:spPr/>
+        <p:txBody>
+          <a:bodyPr/>
+          <a:lstStyle/>
+          <a:p>
+            <a:fld id="{B4008EB6-D09E-4580-8CD6-DDB14511944F}" type="slidenum">
+              <a:rPr lang="en-US" smtClean="0"/>
+              <a:pPr/>
+              <a:t>14</a:t>
+            </a:fld>
+            <a:endParaRPr lang="en-US" dirty="0"/>
+          </a:p>
+        </p:txBody>
+      </p:sp>
+      <p:sp>
+        <p:nvSpPr>
+          <p:cNvPr id="10" name="Date Placeholder 9"/>
+          <p:cNvSpPr>
+            <a:spLocks noGrp="1"/>
+          </p:cNvSpPr>
+          <p:nvPr>
+            <p:ph type="dt" idx="13"/>
+          </p:nvPr>
+        </p:nvSpPr>
+        <p:spPr/>
+        <p:txBody>
+          <a:bodyPr/>
+          <a:lstStyle/>
+          <a:p>
+            <a:fld id="{6108602D-D426-4C00-B215-BFA18C076426}" type="datetime8">
+              <a:rPr lang="en-US" smtClean="0"/>
+              <a:t>10/20/2016 11:44 AM</a:t>
+            </a:fld>
+            <a:endParaRPr lang="en-US" dirty="0"/>
+          </a:p>
+        </p:txBody>
+      </p:sp>
+      <p:sp>
+        <p:nvSpPr>
+          <p:cNvPr id="4" name="Footer Placeholder 3"/>
+          <p:cNvSpPr>
+            <a:spLocks noGrp="1"/>
+          </p:cNvSpPr>
+          <p:nvPr>
+            <p:ph type="ftr" sz="quarter" idx="14"/>
+          </p:nvPr>
+        </p:nvSpPr>
+        <p:spPr/>
+        <p:txBody>
+          <a:bodyPr/>
+          <a:lstStyle/>
+          <a:p>
+            <a:pPr defTabSz="914099" eaLnBrk="0" hangingPunct="0"/>
+            <a:r>
+              <a:rPr lang="en-US" sz="400" dirty="0">
+                <a:gradFill>
+                  <a:gsLst>
+                    <a:gs pos="0">
+                      <a:prstClr val="black"/>
+                    </a:gs>
+                    <a:gs pos="100000">
+                      <a:prstClr val="black"/>
+                    </a:gs>
+                  </a:gsLst>
+                  <a:lin ang="5400000" scaled="0"/>
+                </a:gradFill>
+                <a:latin typeface="Segoe UI" pitchFamily="34" charset="0"/>
+                <a:ea typeface="Segoe UI" pitchFamily="34" charset="0"/>
+                <a:cs typeface="Segoe UI" pitchFamily="34" charset="0"/>
+              </a:rPr>
+              <a:t>© 2016 Microsoft Corporation. All rights reserved. MICROSOFT MAKES NO WARRANTIES, EXPRESS, IMPLIED OR STATUTORY, AS TO THE INFORMATION IN THIS PRESENTATION.</a:t>
+            </a:r>
+          </a:p>
+        </p:txBody>
+      </p:sp>
+      <p:sp>
+        <p:nvSpPr>
+          <p:cNvPr id="5" name="Header Placeholder 4"/>
+          <p:cNvSpPr>
+            <a:spLocks noGrp="1"/>
+          </p:cNvSpPr>
+          <p:nvPr>
+            <p:ph type="hdr" sz="quarter" idx="15"/>
+          </p:nvPr>
+        </p:nvSpPr>
+        <p:spPr/>
+        <p:txBody>
+          <a:bodyPr/>
+          <a:lstStyle/>
+          <a:p>
+            <a:endParaRPr lang="en-US" dirty="0"/>
+          </a:p>
+        </p:txBody>
+      </p:sp>
+    </p:spTree>
+    <p:extLst>
+      <p:ext uri="{BB962C8B-B14F-4D97-AF65-F5344CB8AC3E}">
+        <p14:creationId xmlns:p14="http://schemas.microsoft.com/office/powerpoint/2010/main" val="613529149"/>
+      </p:ext>
+    </p:extLst>
+  </p:cSld>
+  <p:clrMapOvr>
+    <a:masterClrMapping/>
+  </p:clrMapOvr>
+</p:notes>
+</file>
+
+<file path=ppt/notesSlides/notesSlide12.xml><?xml version="1.0" encoding="utf-8"?>
+<p:notes xmlns:a="http://schemas.openxmlformats.org/drawingml/2006/main" xmlns:r="http://schemas.openxmlformats.org/officeDocument/2006/relationships" xmlns:p="http://schemas.openxmlformats.org/presentationml/2006/main">
+  <p:cSld>
+    <p:spTree>
+      <p:nvGrpSpPr>
+        <p:cNvPr id="1" name=""/>
+        <p:cNvGrpSpPr/>
+        <p:nvPr/>
+      </p:nvGrpSpPr>
+      <p:grpSpPr>
+        <a:xfrm>
+          <a:off x="0" y="0"/>
+          <a:ext cx="0" cy="0"/>
+          <a:chOff x="0" y="0"/>
+          <a:chExt cx="0" cy="0"/>
+        </a:xfrm>
+      </p:grpSpPr>
+      <p:sp>
+        <p:nvSpPr>
+          <p:cNvPr id="2" name="Slide Image Placeholder 1"/>
+          <p:cNvSpPr>
+            <a:spLocks noGrp="1" noRot="1" noChangeAspect="1"/>
+          </p:cNvSpPr>
+          <p:nvPr>
+            <p:ph type="sldImg"/>
+          </p:nvPr>
+        </p:nvSpPr>
+        <p:spPr/>
+      </p:sp>
+      <p:sp>
+        <p:nvSpPr>
+          <p:cNvPr id="3" name="Notes Placeholder 2"/>
+          <p:cNvSpPr>
+            <a:spLocks noGrp="1"/>
+          </p:cNvSpPr>
+          <p:nvPr>
+            <p:ph type="body" idx="1"/>
+          </p:nvPr>
+        </p:nvSpPr>
+        <p:spPr/>
+        <p:txBody>
+          <a:bodyPr/>
+          <a:lstStyle/>
+          <a:p>
             <a:endParaRPr lang="en-US" dirty="0"/>
           </a:p>
         </p:txBody>
@@ -1382,7 +1474,7 @@
           <a:p>
             <a:fld id="{E74353ED-ACB2-44BF-A903-985B0AF962B7}" type="datetime1">
               <a:rPr lang="en-US" smtClean="0"/>
-              <a:t>10/19/2016</a:t>
+              <a:t>10/20/2016</a:t>
             </a:fld>
             <a:endParaRPr lang="en-US" dirty="0"/>
           </a:p>
@@ -1575,7 +1667,7 @@
           <a:p>
             <a:fld id="{38EEC551-8CDA-4EB6-89BB-2A86C9F091C8}" type="datetime8">
               <a:rPr lang="en-US" smtClean="0"/>
-              <a:t>10/19/2016 6:32 PM</a:t>
+              <a:t>10/20/2016 11:44 AM</a:t>
             </a:fld>
             <a:endParaRPr lang="en-US" dirty="0"/>
           </a:p>
@@ -1829,7 +1921,7 @@
           <a:p>
             <a:fld id="{90EC29EE-A8AD-4CE0-9C0B-116E0D4D7533}" type="datetime8">
               <a:rPr lang="en-US" smtClean="0"/>
-              <a:t>10/19/2016 6:32 PM</a:t>
+              <a:t>10/20/2016 11:44 AM</a:t>
             </a:fld>
             <a:endParaRPr lang="en-US" dirty="0"/>
           </a:p>
@@ -2168,7 +2260,7 @@
                 <a:tabLst/>
                 <a:defRPr/>
               </a:pPr>
-              <a:t>10/19/2016 6:32 PM</a:t>
+              <a:t>10/20/2016 11:44 AM</a:t>
             </a:fld>
             <a:endParaRPr kumimoji="0" lang="en-US" sz="1800" b="0" i="0" u="none" strike="noStrike" kern="0" cap="none" spc="0" normalizeH="0" baseline="0" noProof="0" dirty="0">
               <a:ln>
@@ -2515,7 +2607,7 @@
                 <a:tabLst/>
                 <a:defRPr/>
               </a:pPr>
-              <a:t>10/19/2016 6:32 PM</a:t>
+              <a:t>10/20/2016 11:44 AM</a:t>
             </a:fld>
             <a:endParaRPr kumimoji="0" lang="en-US" sz="1800" b="0" i="0" u="none" strike="noStrike" kern="0" cap="none" spc="0" normalizeH="0" baseline="0" noProof="0" dirty="0">
               <a:ln>
@@ -2779,7 +2871,7 @@
           <a:p>
             <a:fld id="{38EEC551-8CDA-4EB6-89BB-2A86C9F091C8}" type="datetime8">
               <a:rPr lang="en-US" smtClean="0"/>
-              <a:t>10/19/2016 6:32 PM</a:t>
+              <a:t>10/20/2016 11:44 AM</a:t>
             </a:fld>
             <a:endParaRPr lang="en-US" dirty="0"/>
           </a:p>
@@ -2868,187 +2960,37 @@
           <a:p>
             <a:r>
               <a:rPr lang="en-US" dirty="0"/>
-              <a:t>So lets take a look at two</a:t>
-            </a:r>
-            <a:r>
-              <a:rPr lang="en-US" baseline="0" dirty="0"/>
-              <a:t> different clusters</a:t>
-            </a:r>
-          </a:p>
-          <a:p>
-            <a:endParaRPr lang="en-US" baseline="0" dirty="0"/>
-          </a:p>
-          <a:p>
-            <a:pPr marL="228600" indent="-228600">
-              <a:buAutoNum type="arabicParenR"/>
-            </a:pPr>
-            <a:r>
-              <a:rPr lang="en-US" baseline="0" dirty="0"/>
-              <a:t>Local machine (with SDK)</a:t>
-            </a:r>
-          </a:p>
-          <a:p>
-            <a:pPr marL="388712" lvl="1" indent="-171450">
-              <a:buFont typeface="Arial" panose="020B0604020202020204" pitchFamily="34" charset="0"/>
-              <a:buChar char="•"/>
-            </a:pPr>
-            <a:r>
-              <a:rPr lang="en-US" baseline="0" dirty="0"/>
-              <a:t>pull up the local copy of the portal http://localhost:19080</a:t>
-            </a:r>
-          </a:p>
-          <a:p>
-            <a:pPr marL="506114" lvl="2" indent="-171450">
-              <a:buFont typeface="Arial" panose="020B0604020202020204" pitchFamily="34" charset="0"/>
-              <a:buChar char="•"/>
-            </a:pPr>
-            <a:r>
-              <a:rPr lang="en-US" baseline="0" dirty="0"/>
-              <a:t>Cluster Services</a:t>
-            </a:r>
-          </a:p>
-          <a:p>
-            <a:pPr marL="664001" lvl="3" indent="-171450">
-              <a:buFont typeface="Arial" panose="020B0604020202020204" pitchFamily="34" charset="0"/>
-              <a:buChar char="•"/>
-            </a:pPr>
-            <a:r>
-              <a:rPr lang="en-US" baseline="0" dirty="0"/>
-              <a:t>Failover Manager: deals with nodes being added or removed from the cluster. Redistributing services as needed</a:t>
-            </a:r>
-          </a:p>
-          <a:p>
-            <a:pPr marL="664001" marR="0" lvl="3" indent="-171450" algn="l" defTabSz="932742" rtl="0" eaLnBrk="1" fontAlgn="auto" latinLnBrk="0" hangingPunct="1">
-              <a:lnSpc>
-                <a:spcPct val="90000"/>
-              </a:lnSpc>
-              <a:spcBef>
-                <a:spcPts val="0"/>
-              </a:spcBef>
-              <a:spcAft>
-                <a:spcPts val="340"/>
-              </a:spcAft>
-              <a:buClrTx/>
-              <a:buSzTx/>
-              <a:buFont typeface="Arial" panose="020B0604020202020204" pitchFamily="34" charset="0"/>
-              <a:buChar char="•"/>
-              <a:tabLst/>
-              <a:defRPr/>
-            </a:pPr>
-            <a:r>
-              <a:rPr lang="en-US" baseline="0" dirty="0"/>
-              <a:t>Cluster Manager: works with the failover manager to place services on nodes</a:t>
-            </a:r>
-          </a:p>
-          <a:p>
-            <a:pPr marL="664001" lvl="3" indent="-171450">
-              <a:buFont typeface="Arial" panose="020B0604020202020204" pitchFamily="34" charset="0"/>
-              <a:buChar char="•"/>
-            </a:pPr>
-            <a:r>
-              <a:rPr lang="en-US" baseline="0" dirty="0"/>
-              <a:t>Naming Service: allows for discovery of services and their endpoints</a:t>
-            </a:r>
-          </a:p>
-          <a:p>
-            <a:pPr marL="506114" lvl="2" indent="-171450">
-              <a:buFont typeface="Arial" panose="020B0604020202020204" pitchFamily="34" charset="0"/>
-              <a:buChar char="•"/>
-            </a:pPr>
-            <a:r>
-              <a:rPr lang="en-US" baseline="0" dirty="0"/>
-              <a:t>Node distribution</a:t>
-            </a:r>
-          </a:p>
-          <a:p>
-            <a:pPr marL="388712" lvl="1" indent="-171450">
-              <a:buFont typeface="Arial" panose="020B0604020202020204" pitchFamily="34" charset="0"/>
-              <a:buChar char="•"/>
-            </a:pPr>
-            <a:r>
-              <a:rPr lang="en-US" baseline="0" dirty="0"/>
-              <a:t>Services (only addressable from within the cluster)</a:t>
-            </a:r>
-          </a:p>
-          <a:p>
-            <a:pPr marL="388712" lvl="1" indent="-171450">
-              <a:buFont typeface="Arial" panose="020B0604020202020204" pitchFamily="34" charset="0"/>
-              <a:buChar char="•"/>
-            </a:pPr>
-            <a:r>
-              <a:rPr lang="en-US" baseline="0" dirty="0"/>
-              <a:t>Process threads</a:t>
-            </a:r>
-          </a:p>
-          <a:p>
-            <a:pPr marL="228600" indent="-228600">
-              <a:buAutoNum type="arabicParenR"/>
-            </a:pPr>
-            <a:r>
-              <a:rPr lang="en-US" baseline="0" dirty="0"/>
-              <a:t>Azure Hosted</a:t>
-            </a:r>
-          </a:p>
-          <a:p>
-            <a:pPr marL="388712" lvl="1" indent="-171450">
-              <a:buFont typeface="Arial" panose="020B0604020202020204" pitchFamily="34" charset="0"/>
-              <a:buChar char="•"/>
-            </a:pPr>
-            <a:r>
-              <a:rPr lang="en-US" baseline="0" dirty="0"/>
-              <a:t>Resource group – examine resources</a:t>
-            </a:r>
-          </a:p>
-          <a:p>
-            <a:pPr marL="388712" lvl="1" indent="-171450">
-              <a:buFont typeface="Arial" panose="020B0604020202020204" pitchFamily="34" charset="0"/>
-              <a:buChar char="•"/>
-            </a:pPr>
-            <a:r>
-              <a:rPr lang="en-US" baseline="0" dirty="0"/>
-              <a:t>Portal </a:t>
-            </a:r>
-          </a:p>
-          <a:p>
-            <a:pPr marL="506114" marR="0" lvl="2" indent="-171450" algn="l" defTabSz="932742" rtl="0" eaLnBrk="1" fontAlgn="auto" latinLnBrk="0" hangingPunct="1">
-              <a:lnSpc>
-                <a:spcPct val="90000"/>
-              </a:lnSpc>
-              <a:spcBef>
-                <a:spcPts val="0"/>
-              </a:spcBef>
-              <a:spcAft>
-                <a:spcPts val="340"/>
-              </a:spcAft>
-              <a:buClrTx/>
-              <a:buSzTx/>
-              <a:buFont typeface="Arial" panose="020B0604020202020204" pitchFamily="34" charset="0"/>
-              <a:buChar char="•"/>
-              <a:tabLst/>
-              <a:defRPr/>
-            </a:pPr>
-            <a:r>
-              <a:rPr lang="en-US" baseline="0" dirty="0"/>
-              <a:t>Image Service: the application/service store. register and store packages. Doesn’t appear on the local cluster since its on the local disk</a:t>
-            </a:r>
-          </a:p>
-          <a:p>
-            <a:pPr marL="388712" lvl="1" indent="-171450">
-              <a:buFont typeface="Arial" panose="020B0604020202020204" pitchFamily="34" charset="0"/>
-              <a:buChar char="•"/>
-            </a:pPr>
-            <a:endParaRPr lang="en-US" baseline="0" dirty="0"/>
+              <a:t>https://azure.microsoft.com/en-us/documentation/articles/service-fabric-connect-and-communicate-with-services/</a:t>
+            </a:r>
+          </a:p>
+          <a:p>
+            <a:endParaRPr lang="en-US"/>
+          </a:p>
+          <a:p>
+            <a:r>
+              <a:rPr lang="en-US"/>
+              <a:t>https://azure.microsoft.com/en-us/documentation/articles/service-fabric-service-manifest-resources/</a:t>
+            </a:r>
+          </a:p>
+          <a:p>
+            <a:endParaRPr lang="en-US" dirty="0"/>
+          </a:p>
+          <a:p>
+            <a:r>
+              <a:rPr lang="en-US" dirty="0"/>
+              <a:t>http://www.jamessturtevant.com/posts/Integrating-ASPNET-Core-With-Service-Fabric-using-ICommunicationListener/</a:t>
+            </a:r>
           </a:p>
         </p:txBody>
       </p:sp>
       <p:sp>
         <p:nvSpPr>
-          <p:cNvPr id="4" name="Slide Number Placeholder 3"/>
+          <p:cNvPr id="4" name="Header Placeholder 3"/>
           <p:cNvSpPr>
             <a:spLocks noGrp="1"/>
           </p:cNvSpPr>
           <p:nvPr>
-            <p:ph type="sldNum" sz="quarter" idx="10"/>
+            <p:ph type="hdr" sz="quarter" idx="10"/>
           </p:nvPr>
         </p:nvSpPr>
         <p:spPr/>
@@ -3056,18 +2998,119 @@
           <a:bodyPr/>
           <a:lstStyle/>
           <a:p>
-            <a:fld id="{EF64FA26-052C-4EE5-A78C-762B03CD0F2A}" type="slidenum">
+            <a:r>
+              <a:rPr lang="en-US"/>
+              <a:t>Microsoft Build 2016</a:t>
+            </a:r>
+            <a:endParaRPr lang="en-US" dirty="0"/>
+          </a:p>
+        </p:txBody>
+      </p:sp>
+      <p:sp>
+        <p:nvSpPr>
+          <p:cNvPr id="5" name="Footer Placeholder 4"/>
+          <p:cNvSpPr>
+            <a:spLocks noGrp="1"/>
+          </p:cNvSpPr>
+          <p:nvPr>
+            <p:ph type="ftr" sz="quarter" idx="11"/>
+          </p:nvPr>
+        </p:nvSpPr>
+        <p:spPr/>
+        <p:txBody>
+          <a:bodyPr/>
+          <a:lstStyle/>
+          <a:p>
+            <a:pPr defTabSz="914099" eaLnBrk="0" hangingPunct="0"/>
+            <a:r>
+              <a:rPr lang="en-US" sz="400">
+                <a:gradFill>
+                  <a:gsLst>
+                    <a:gs pos="0">
+                      <a:prstClr val="black"/>
+                    </a:gs>
+                    <a:gs pos="100000">
+                      <a:prstClr val="black"/>
+                    </a:gs>
+                  </a:gsLst>
+                  <a:lin ang="5400000" scaled="0"/>
+                </a:gradFill>
+                <a:latin typeface="Segoe UI" pitchFamily="34" charset="0"/>
+                <a:ea typeface="Segoe UI" pitchFamily="34" charset="0"/>
+                <a:cs typeface="Segoe UI" pitchFamily="34" charset="0"/>
+              </a:rPr>
+              <a:t>© 2016 Microsoft Corporation. All rights reserved. MICROSOFT MAKES NO WARRANTIES, EXPRESS, IMPLIED OR STATUTORY, AS TO THE INFORMATION IN THIS PRESENTATION.</a:t>
+            </a:r>
+            <a:endParaRPr lang="en-US" sz="400" dirty="0">
+              <a:gradFill>
+                <a:gsLst>
+                  <a:gs pos="0">
+                    <a:prstClr val="black"/>
+                  </a:gs>
+                  <a:gs pos="100000">
+                    <a:prstClr val="black"/>
+                  </a:gs>
+                </a:gsLst>
+                <a:lin ang="5400000" scaled="0"/>
+              </a:gradFill>
+              <a:latin typeface="Segoe UI" pitchFamily="34" charset="0"/>
+              <a:ea typeface="Segoe UI" pitchFamily="34" charset="0"/>
+              <a:cs typeface="Segoe UI" pitchFamily="34" charset="0"/>
+            </a:endParaRPr>
+          </a:p>
+        </p:txBody>
+      </p:sp>
+      <p:sp>
+        <p:nvSpPr>
+          <p:cNvPr id="6" name="Date Placeholder 5"/>
+          <p:cNvSpPr>
+            <a:spLocks noGrp="1"/>
+          </p:cNvSpPr>
+          <p:nvPr>
+            <p:ph type="dt" idx="12"/>
+          </p:nvPr>
+        </p:nvSpPr>
+        <p:spPr/>
+        <p:txBody>
+          <a:bodyPr/>
+          <a:lstStyle/>
+          <a:p>
+            <a:fld id="{38EEC551-8CDA-4EB6-89BB-2A86C9F091C8}" type="datetime8">
               <a:rPr lang="en-US" smtClean="0"/>
-              <a:t>11</a:t>
+              <a:t>10/20/2016 11:49 AM</a:t>
             </a:fld>
-            <a:endParaRPr lang="en-US"/>
+            <a:endParaRPr lang="en-US" dirty="0"/>
+          </a:p>
+        </p:txBody>
+      </p:sp>
+      <p:sp>
+        <p:nvSpPr>
+          <p:cNvPr id="7" name="Slide Number Placeholder 6"/>
+          <p:cNvSpPr>
+            <a:spLocks noGrp="1"/>
+          </p:cNvSpPr>
+          <p:nvPr>
+            <p:ph type="sldNum" sz="quarter" idx="13"/>
+          </p:nvPr>
+        </p:nvSpPr>
+        <p:spPr/>
+        <p:txBody>
+          <a:bodyPr/>
+          <a:lstStyle/>
+          <a:p>
+            <a:fld id="{B4008EB6-D09E-4580-8CD6-DDB14511944F}" type="slidenum">
+              <a:rPr lang="en-US" smtClean="0"/>
+              <a:pPr/>
+              <a:t>9</a:t>
+            </a:fld>
+            <a:endParaRPr lang="en-US" dirty="0"/>
           </a:p>
         </p:txBody>
       </p:sp>
     </p:spTree>
     <p:extLst>
       <p:ext uri="{BB962C8B-B14F-4D97-AF65-F5344CB8AC3E}">
-        <p14:creationId xmlns:p14="http://schemas.microsoft.com/office/powerpoint/2010/main" val="690187670"/>
+        <p14:creationId xmlns:p14="http://schemas.microsoft.com/office/powerpoint/2010/main" val="2348788524"/>
       </p:ext>
     </p:extLst>
   </p:cSld>
@@ -3121,18 +3164,189 @@
           <a:bodyPr/>
           <a:lstStyle/>
           <a:p>
-            <a:endParaRPr lang="en-US" dirty="0"/>
+            <a:r>
+              <a:rPr lang="en-US" dirty="0"/>
+              <a:t>So lets take a look at two</a:t>
+            </a:r>
+            <a:r>
+              <a:rPr lang="en-US" baseline="0" dirty="0"/>
+              <a:t> different clusters</a:t>
+            </a:r>
+          </a:p>
+          <a:p>
+            <a:endParaRPr lang="en-US" baseline="0" dirty="0"/>
+          </a:p>
+          <a:p>
+            <a:pPr marL="228600" indent="-228600">
+              <a:buAutoNum type="arabicParenR"/>
+            </a:pPr>
+            <a:r>
+              <a:rPr lang="en-US" baseline="0" dirty="0"/>
+              <a:t>Local machine (with SDK)</a:t>
+            </a:r>
+          </a:p>
+          <a:p>
+            <a:pPr marL="388712" lvl="1" indent="-171450">
+              <a:buFont typeface="Arial" panose="020B0604020202020204" pitchFamily="34" charset="0"/>
+              <a:buChar char="•"/>
+            </a:pPr>
+            <a:r>
+              <a:rPr lang="en-US" baseline="0" dirty="0"/>
+              <a:t>pull up the local copy of the portal http://localhost:19080</a:t>
+            </a:r>
+          </a:p>
+          <a:p>
+            <a:pPr marL="506114" lvl="2" indent="-171450">
+              <a:buFont typeface="Arial" panose="020B0604020202020204" pitchFamily="34" charset="0"/>
+              <a:buChar char="•"/>
+            </a:pPr>
+            <a:r>
+              <a:rPr lang="en-US" baseline="0" dirty="0"/>
+              <a:t>Cluster Services</a:t>
+            </a:r>
+          </a:p>
+          <a:p>
+            <a:pPr marL="664001" lvl="3" indent="-171450">
+              <a:buFont typeface="Arial" panose="020B0604020202020204" pitchFamily="34" charset="0"/>
+              <a:buChar char="•"/>
+            </a:pPr>
+            <a:r>
+              <a:rPr lang="en-US" baseline="0" dirty="0"/>
+              <a:t>Failover Manager: deals with nodes being added or removed from the cluster. Redistributing services as needed</a:t>
+            </a:r>
+          </a:p>
+          <a:p>
+            <a:pPr marL="664001" marR="0" lvl="3" indent="-171450" algn="l" defTabSz="932742" rtl="0" eaLnBrk="1" fontAlgn="auto" latinLnBrk="0" hangingPunct="1">
+              <a:lnSpc>
+                <a:spcPct val="90000"/>
+              </a:lnSpc>
+              <a:spcBef>
+                <a:spcPts val="0"/>
+              </a:spcBef>
+              <a:spcAft>
+                <a:spcPts val="340"/>
+              </a:spcAft>
+              <a:buClrTx/>
+              <a:buSzTx/>
+              <a:buFont typeface="Arial" panose="020B0604020202020204" pitchFamily="34" charset="0"/>
+              <a:buChar char="•"/>
+              <a:tabLst/>
+              <a:defRPr/>
+            </a:pPr>
+            <a:r>
+              <a:rPr lang="en-US" baseline="0" dirty="0"/>
+              <a:t>Cluster Manager: works with the failover manager to place services on nodes</a:t>
+            </a:r>
+          </a:p>
+          <a:p>
+            <a:pPr marL="664001" lvl="3" indent="-171450">
+              <a:buFont typeface="Arial" panose="020B0604020202020204" pitchFamily="34" charset="0"/>
+              <a:buChar char="•"/>
+            </a:pPr>
+            <a:r>
+              <a:rPr lang="en-US" baseline="0" dirty="0"/>
+              <a:t>Naming Service: allows for discovery of services and their endpoints</a:t>
+            </a:r>
+          </a:p>
+          <a:p>
+            <a:pPr marL="506114" lvl="2" indent="-171450">
+              <a:buFont typeface="Arial" panose="020B0604020202020204" pitchFamily="34" charset="0"/>
+              <a:buChar char="•"/>
+            </a:pPr>
+            <a:r>
+              <a:rPr lang="en-US" baseline="0" dirty="0"/>
+              <a:t>Node distribution</a:t>
+            </a:r>
+          </a:p>
+          <a:p>
+            <a:pPr marL="388712" lvl="1" indent="-171450">
+              <a:buFont typeface="Arial" panose="020B0604020202020204" pitchFamily="34" charset="0"/>
+              <a:buChar char="•"/>
+            </a:pPr>
+            <a:r>
+              <a:rPr lang="en-US" baseline="0" dirty="0"/>
+              <a:t>Services (only addressable from within the cluster)</a:t>
+            </a:r>
+          </a:p>
+          <a:p>
+            <a:pPr marL="388712" lvl="1" indent="-171450">
+              <a:buFont typeface="Arial" panose="020B0604020202020204" pitchFamily="34" charset="0"/>
+              <a:buChar char="•"/>
+            </a:pPr>
+            <a:r>
+              <a:rPr lang="en-US" baseline="0" dirty="0"/>
+              <a:t>Process threads</a:t>
+            </a:r>
+          </a:p>
+          <a:p>
+            <a:pPr marL="228600" indent="-228600">
+              <a:buAutoNum type="arabicParenR"/>
+            </a:pPr>
+            <a:r>
+              <a:rPr lang="en-US" baseline="0" dirty="0"/>
+              <a:t>Azure Hosted</a:t>
+            </a:r>
+          </a:p>
+          <a:p>
+            <a:pPr marL="388712" lvl="1" indent="-171450">
+              <a:buFont typeface="Arial" panose="020B0604020202020204" pitchFamily="34" charset="0"/>
+              <a:buChar char="•"/>
+            </a:pPr>
+            <a:r>
+              <a:rPr lang="en-US" baseline="0" dirty="0"/>
+              <a:t>Resource group – examine resources</a:t>
+            </a:r>
+          </a:p>
+          <a:p>
+            <a:pPr marL="388712" lvl="1" indent="-171450">
+              <a:buFont typeface="Arial" panose="020B0604020202020204" pitchFamily="34" charset="0"/>
+              <a:buChar char="•"/>
+            </a:pPr>
+            <a:r>
+              <a:rPr lang="en-US" baseline="0" dirty="0"/>
+              <a:t>Portal </a:t>
+            </a:r>
+          </a:p>
+          <a:p>
+            <a:pPr marL="506114" marR="0" lvl="2" indent="-171450" algn="l" defTabSz="932742" rtl="0" eaLnBrk="1" fontAlgn="auto" latinLnBrk="0" hangingPunct="1">
+              <a:lnSpc>
+                <a:spcPct val="90000"/>
+              </a:lnSpc>
+              <a:spcBef>
+                <a:spcPts val="0"/>
+              </a:spcBef>
+              <a:spcAft>
+                <a:spcPts val="340"/>
+              </a:spcAft>
+              <a:buClrTx/>
+              <a:buSzTx/>
+              <a:buFont typeface="Arial" panose="020B0604020202020204" pitchFamily="34" charset="0"/>
+              <a:buChar char="•"/>
+              <a:tabLst/>
+              <a:defRPr/>
+            </a:pPr>
+            <a:r>
+              <a:rPr lang="en-US" baseline="0" dirty="0"/>
+              <a:t>Image Service: the application/service store. register and store packages. Doesn’t appear on the local cluster since its on the local disk</a:t>
+            </a:r>
+          </a:p>
+          <a:p>
+            <a:pPr marL="388712" lvl="1" indent="-171450">
+              <a:buFont typeface="Arial" panose="020B0604020202020204" pitchFamily="34" charset="0"/>
+              <a:buChar char="•"/>
+            </a:pPr>
+            <a:endParaRPr lang="en-US" baseline="0" dirty="0"/>
           </a:p>
         </p:txBody>
       </p:sp>
       <p:sp>
         <p:nvSpPr>
-          <p:cNvPr id="4" name="Header Placeholder 3"/>
+          <p:cNvPr id="4" name="Slide Number Placeholder 3"/>
           <p:cNvSpPr>
             <a:spLocks noGrp="1"/>
           </p:cNvSpPr>
           <p:nvPr>
-            <p:ph type="hdr" sz="quarter" idx="10"/>
+            <p:ph type="sldNum" sz="quarter" idx="10"/>
           </p:nvPr>
         </p:nvSpPr>
         <p:spPr/>
@@ -3140,119 +3354,18 @@
           <a:bodyPr/>
           <a:lstStyle/>
           <a:p>
-            <a:r>
-              <a:rPr lang="en-US"/>
-              <a:t>Microsoft Build 2016</a:t>
-            </a:r>
-            <a:endParaRPr lang="en-US" dirty="0"/>
-          </a:p>
-        </p:txBody>
-      </p:sp>
-      <p:sp>
-        <p:nvSpPr>
-          <p:cNvPr id="5" name="Footer Placeholder 4"/>
-          <p:cNvSpPr>
-            <a:spLocks noGrp="1"/>
-          </p:cNvSpPr>
-          <p:nvPr>
-            <p:ph type="ftr" sz="quarter" idx="11"/>
-          </p:nvPr>
-        </p:nvSpPr>
-        <p:spPr/>
-        <p:txBody>
-          <a:bodyPr/>
-          <a:lstStyle/>
-          <a:p>
-            <a:pPr defTabSz="914099" eaLnBrk="0" hangingPunct="0"/>
-            <a:r>
-              <a:rPr lang="en-US" sz="400">
-                <a:gradFill>
-                  <a:gsLst>
-                    <a:gs pos="0">
-                      <a:prstClr val="black"/>
-                    </a:gs>
-                    <a:gs pos="100000">
-                      <a:prstClr val="black"/>
-                    </a:gs>
-                  </a:gsLst>
-                  <a:lin ang="5400000" scaled="0"/>
-                </a:gradFill>
-                <a:latin typeface="Segoe UI" pitchFamily="34" charset="0"/>
-                <a:ea typeface="Segoe UI" pitchFamily="34" charset="0"/>
-                <a:cs typeface="Segoe UI" pitchFamily="34" charset="0"/>
-              </a:rPr>
-              <a:t>© 2016 Microsoft Corporation. All rights reserved. MICROSOFT MAKES NO WARRANTIES, EXPRESS, IMPLIED OR STATUTORY, AS TO THE INFORMATION IN THIS PRESENTATION.</a:t>
-            </a:r>
-            <a:endParaRPr lang="en-US" sz="400" dirty="0">
-              <a:gradFill>
-                <a:gsLst>
-                  <a:gs pos="0">
-                    <a:prstClr val="black"/>
-                  </a:gs>
-                  <a:gs pos="100000">
-                    <a:prstClr val="black"/>
-                  </a:gs>
-                </a:gsLst>
-                <a:lin ang="5400000" scaled="0"/>
-              </a:gradFill>
-              <a:latin typeface="Segoe UI" pitchFamily="34" charset="0"/>
-              <a:ea typeface="Segoe UI" pitchFamily="34" charset="0"/>
-              <a:cs typeface="Segoe UI" pitchFamily="34" charset="0"/>
-            </a:endParaRPr>
-          </a:p>
-        </p:txBody>
-      </p:sp>
-      <p:sp>
-        <p:nvSpPr>
-          <p:cNvPr id="6" name="Date Placeholder 5"/>
-          <p:cNvSpPr>
-            <a:spLocks noGrp="1"/>
-          </p:cNvSpPr>
-          <p:nvPr>
-            <p:ph type="dt" idx="12"/>
-          </p:nvPr>
-        </p:nvSpPr>
-        <p:spPr/>
-        <p:txBody>
-          <a:bodyPr/>
-          <a:lstStyle/>
-          <a:p>
-            <a:fld id="{38EEC551-8CDA-4EB6-89BB-2A86C9F091C8}" type="datetime8">
+            <a:fld id="{EF64FA26-052C-4EE5-A78C-762B03CD0F2A}" type="slidenum">
               <a:rPr lang="en-US" smtClean="0"/>
-              <a:t>10/19/2016 7:32 PM</a:t>
+              <a:t>11</a:t>
             </a:fld>
-            <a:endParaRPr lang="en-US" dirty="0"/>
-          </a:p>
-        </p:txBody>
-      </p:sp>
-      <p:sp>
-        <p:nvSpPr>
-          <p:cNvPr id="7" name="Slide Number Placeholder 6"/>
-          <p:cNvSpPr>
-            <a:spLocks noGrp="1"/>
-          </p:cNvSpPr>
-          <p:nvPr>
-            <p:ph type="sldNum" sz="quarter" idx="13"/>
-          </p:nvPr>
-        </p:nvSpPr>
-        <p:spPr/>
-        <p:txBody>
-          <a:bodyPr/>
-          <a:lstStyle/>
-          <a:p>
-            <a:fld id="{B4008EB6-D09E-4580-8CD6-DDB14511944F}" type="slidenum">
-              <a:rPr lang="en-US" smtClean="0"/>
-              <a:pPr/>
-              <a:t>12</a:t>
-            </a:fld>
-            <a:endParaRPr lang="en-US" dirty="0"/>
+            <a:endParaRPr lang="en-US"/>
           </a:p>
         </p:txBody>
       </p:sp>
     </p:spTree>
     <p:extLst>
       <p:ext uri="{BB962C8B-B14F-4D97-AF65-F5344CB8AC3E}">
-        <p14:creationId xmlns:p14="http://schemas.microsoft.com/office/powerpoint/2010/main" val="891325411"/>
+        <p14:creationId xmlns:p14="http://schemas.microsoft.com/office/powerpoint/2010/main" val="690187670"/>
       </p:ext>
     </p:extLst>
   </p:cSld>
@@ -3306,26 +3419,18 @@
           <a:bodyPr/>
           <a:lstStyle/>
           <a:p>
-            <a:r>
-              <a:rPr lang="en-US" dirty="0"/>
-              <a:t>Too many learning</a:t>
-            </a:r>
-            <a:r>
-              <a:rPr lang="en-US" baseline="0" dirty="0"/>
-              <a:t> materials to list here. I’ve put some of my favorites, along with a link to his presentation and some related materials up on GitHub.. Enjoy and check back for updates as things continue to mature. </a:t>
-            </a:r>
             <a:endParaRPr lang="en-US" dirty="0"/>
           </a:p>
         </p:txBody>
       </p:sp>
       <p:sp>
         <p:nvSpPr>
-          <p:cNvPr id="4" name="Slide Number Placeholder 3"/>
+          <p:cNvPr id="4" name="Header Placeholder 3"/>
           <p:cNvSpPr>
             <a:spLocks noGrp="1"/>
           </p:cNvSpPr>
           <p:nvPr>
-            <p:ph type="sldNum" sz="quarter" idx="10"/>
+            <p:ph type="hdr" sz="quarter" idx="10"/>
           </p:nvPr>
         </p:nvSpPr>
         <p:spPr/>
@@ -3333,18 +3438,119 @@
           <a:bodyPr/>
           <a:lstStyle/>
           <a:p>
-            <a:fld id="{EF64FA26-052C-4EE5-A78C-762B03CD0F2A}" type="slidenum">
+            <a:r>
+              <a:rPr lang="en-US"/>
+              <a:t>Microsoft Build 2016</a:t>
+            </a:r>
+            <a:endParaRPr lang="en-US" dirty="0"/>
+          </a:p>
+        </p:txBody>
+      </p:sp>
+      <p:sp>
+        <p:nvSpPr>
+          <p:cNvPr id="5" name="Footer Placeholder 4"/>
+          <p:cNvSpPr>
+            <a:spLocks noGrp="1"/>
+          </p:cNvSpPr>
+          <p:nvPr>
+            <p:ph type="ftr" sz="quarter" idx="11"/>
+          </p:nvPr>
+        </p:nvSpPr>
+        <p:spPr/>
+        <p:txBody>
+          <a:bodyPr/>
+          <a:lstStyle/>
+          <a:p>
+            <a:pPr defTabSz="914099" eaLnBrk="0" hangingPunct="0"/>
+            <a:r>
+              <a:rPr lang="en-US" sz="400">
+                <a:gradFill>
+                  <a:gsLst>
+                    <a:gs pos="0">
+                      <a:prstClr val="black"/>
+                    </a:gs>
+                    <a:gs pos="100000">
+                      <a:prstClr val="black"/>
+                    </a:gs>
+                  </a:gsLst>
+                  <a:lin ang="5400000" scaled="0"/>
+                </a:gradFill>
+                <a:latin typeface="Segoe UI" pitchFamily="34" charset="0"/>
+                <a:ea typeface="Segoe UI" pitchFamily="34" charset="0"/>
+                <a:cs typeface="Segoe UI" pitchFamily="34" charset="0"/>
+              </a:rPr>
+              <a:t>© 2016 Microsoft Corporation. All rights reserved. MICROSOFT MAKES NO WARRANTIES, EXPRESS, IMPLIED OR STATUTORY, AS TO THE INFORMATION IN THIS PRESENTATION.</a:t>
+            </a:r>
+            <a:endParaRPr lang="en-US" sz="400" dirty="0">
+              <a:gradFill>
+                <a:gsLst>
+                  <a:gs pos="0">
+                    <a:prstClr val="black"/>
+                  </a:gs>
+                  <a:gs pos="100000">
+                    <a:prstClr val="black"/>
+                  </a:gs>
+                </a:gsLst>
+                <a:lin ang="5400000" scaled="0"/>
+              </a:gradFill>
+              <a:latin typeface="Segoe UI" pitchFamily="34" charset="0"/>
+              <a:ea typeface="Segoe UI" pitchFamily="34" charset="0"/>
+              <a:cs typeface="Segoe UI" pitchFamily="34" charset="0"/>
+            </a:endParaRPr>
+          </a:p>
+        </p:txBody>
+      </p:sp>
+      <p:sp>
+        <p:nvSpPr>
+          <p:cNvPr id="6" name="Date Placeholder 5"/>
+          <p:cNvSpPr>
+            <a:spLocks noGrp="1"/>
+          </p:cNvSpPr>
+          <p:nvPr>
+            <p:ph type="dt" idx="12"/>
+          </p:nvPr>
+        </p:nvSpPr>
+        <p:spPr/>
+        <p:txBody>
+          <a:bodyPr/>
+          <a:lstStyle/>
+          <a:p>
+            <a:fld id="{38EEC551-8CDA-4EB6-89BB-2A86C9F091C8}" type="datetime8">
               <a:rPr lang="en-US" smtClean="0"/>
-              <a:t>13</a:t>
+              <a:t>10/20/2016 11:44 AM</a:t>
             </a:fld>
-            <a:endParaRPr lang="en-US"/>
+            <a:endParaRPr lang="en-US" dirty="0"/>
+          </a:p>
+        </p:txBody>
+      </p:sp>
+      <p:sp>
+        <p:nvSpPr>
+          <p:cNvPr id="7" name="Slide Number Placeholder 6"/>
+          <p:cNvSpPr>
+            <a:spLocks noGrp="1"/>
+          </p:cNvSpPr>
+          <p:nvPr>
+            <p:ph type="sldNum" sz="quarter" idx="13"/>
+          </p:nvPr>
+        </p:nvSpPr>
+        <p:spPr/>
+        <p:txBody>
+          <a:bodyPr/>
+          <a:lstStyle/>
+          <a:p>
+            <a:fld id="{B4008EB6-D09E-4580-8CD6-DDB14511944F}" type="slidenum">
+              <a:rPr lang="en-US" smtClean="0"/>
+              <a:pPr/>
+              <a:t>12</a:t>
+            </a:fld>
+            <a:endParaRPr lang="en-US" dirty="0"/>
           </a:p>
         </p:txBody>
       </p:sp>
     </p:spTree>
     <p:extLst>
       <p:ext uri="{BB962C8B-B14F-4D97-AF65-F5344CB8AC3E}">
-        <p14:creationId xmlns:p14="http://schemas.microsoft.com/office/powerpoint/2010/main" val="3673557410"/>
+        <p14:creationId xmlns:p14="http://schemas.microsoft.com/office/powerpoint/2010/main" val="891325411"/>
       </p:ext>
     </p:extLst>
   </p:cSld>
@@ -25754,6 +25960,96 @@
 </file>
 
 <file path=customXml/item1.xml><?xml version="1.0" encoding="utf-8"?>
+<p:properties xmlns:p="http://schemas.microsoft.com/office/2006/metadata/properties" xmlns:xsi="http://www.w3.org/2001/XMLSchema-instance" xmlns:pc="http://schemas.microsoft.com/office/infopath/2007/PartnerControls">
+  <documentManagement>
+    <LikesCount xmlns="http://schemas.microsoft.com/sharepoint/v3" xsi:nil="true"/>
+    <d12e2661e9634d9aa98bbb375f31aced xmlns="01c77077-aee4-4b5f-bd4e-9cd40a6fff29">
+      <Terms xmlns="http://schemas.microsoft.com/office/infopath/2007/PartnerControls">
+        <TermInfo xmlns="http://schemas.microsoft.com/office/infopath/2007/PartnerControls">
+          <TermName xmlns="http://schemas.microsoft.com/office/infopath/2007/PartnerControls">Moscone Center</TermName>
+          <TermId xmlns="http://schemas.microsoft.com/office/infopath/2007/PartnerControls">d4f36a2e-dd0d-4424-990f-7c93b4e9f063</TermId>
+        </TermInfo>
+      </Terms>
+    </d12e2661e9634d9aa98bbb375f31aced>
+    <Event_x0020_Start_x0020_Date xmlns="01c77077-aee4-4b5f-bd4e-9cd40a6fff29">2016-03-30T07:00:00+00:00</Event_x0020_Start_x0020_Date>
+    <Target_x0020_Audiences xmlns="8ff673fc-3231-4e3a-893b-6d7f7cd32766" xsi:nil="true"/>
+    <iaa5f83406f94009a0f6a3e890699ff7 xmlns="01c77077-aee4-4b5f-bd4e-9cd40a6fff29">
+      <Terms xmlns="http://schemas.microsoft.com/office/infopath/2007/PartnerControls">
+        <TermInfo xmlns="http://schemas.microsoft.com/office/infopath/2007/PartnerControls">
+          <TermName xmlns="http://schemas.microsoft.com/office/infopath/2007/PartnerControls">San Francisco</TermName>
+          <TermId xmlns="http://schemas.microsoft.com/office/infopath/2007/PartnerControls">84dfcb53-432b-499d-8965-93d483d36b4a</TermId>
+        </TermInfo>
+      </Terms>
+    </iaa5f83406f94009a0f6a3e890699ff7>
+    <External_x0020_Speaker xmlns="01c77077-aee4-4b5f-bd4e-9cd40a6fff29" xsi:nil="true"/>
+    <m6878b9dd7994da4ba144f95347d99c6 xmlns="01c77077-aee4-4b5f-bd4e-9cd40a6fff29">
+      <Terms xmlns="http://schemas.microsoft.com/office/infopath/2007/PartnerControls"/>
+    </m6878b9dd7994da4ba144f95347d99c6>
+    <Presentation_x0020_Date xmlns="01c77077-aee4-4b5f-bd4e-9cd40a6fff29" xsi:nil="true"/>
+    <fc15c16204564de583b4c942b10d19ec xmlns="01c77077-aee4-4b5f-bd4e-9cd40a6fff29">
+      <Terms xmlns="http://schemas.microsoft.com/office/infopath/2007/PartnerControls"/>
+    </fc15c16204564de583b4c942b10d19ec>
+    <mb2e01f7e2d8413988e28e59aa226eec xmlns="01c77077-aee4-4b5f-bd4e-9cd40a6fff29">
+      <Terms xmlns="http://schemas.microsoft.com/office/infopath/2007/PartnerControls">
+        <TermInfo xmlns="http://schemas.microsoft.com/office/infopath/2007/PartnerControls">
+          <TermName xmlns="http://schemas.microsoft.com/office/infopath/2007/PartnerControls">Build</TermName>
+          <TermId xmlns="http://schemas.microsoft.com/office/infopath/2007/PartnerControls">58542b36-5bf5-46a6-a53f-a41fb7a73785</TermId>
+        </TermInfo>
+      </Terms>
+    </mb2e01f7e2d8413988e28e59aa226eec>
+    <MS_x0020_Content_x0020_Owner xmlns="01c77077-aee4-4b5f-bd4e-9cd40a6fff29">
+      <UserInfo>
+        <DisplayName/>
+        <AccountId xsi:nil="true"/>
+        <AccountType/>
+      </UserInfo>
+    </MS_x0020_Content_x0020_Owner>
+    <Session_x0020_Code xmlns="01c77077-aee4-4b5f-bd4e-9cd40a6fff29" xsi:nil="true"/>
+    <Event_x0020_End_x0020_Date xmlns="01c77077-aee4-4b5f-bd4e-9cd40a6fff29">2016-04-01T07:00:00+00:00</Event_x0020_End_x0020_Date>
+    <o1010385baed4da9b5076a6aa651d1e5 xmlns="01c77077-aee4-4b5f-bd4e-9cd40a6fff29">
+      <Terms xmlns="http://schemas.microsoft.com/office/infopath/2007/PartnerControls"/>
+    </o1010385baed4da9b5076a6aa651d1e5>
+    <kc6d1bd9a46e4e5fbbbf99ca3de7a092 xmlns="01c77077-aee4-4b5f-bd4e-9cd40a6fff29">
+      <Terms xmlns="http://schemas.microsoft.com/office/infopath/2007/PartnerControls"/>
+    </kc6d1bd9a46e4e5fbbbf99ca3de7a092>
+    <MS_x0020_Speaker xmlns="01c77077-aee4-4b5f-bd4e-9cd40a6fff29">
+      <UserInfo>
+        <DisplayName/>
+        <AccountId xsi:nil="true"/>
+        <AccountType/>
+      </UserInfo>
+    </MS_x0020_Speaker>
+    <TaxKeywordTaxHTField xmlns="230e9df3-be65-4c73-a93b-d1236ebd677e">
+      <Terms xmlns="http://schemas.microsoft.com/office/infopath/2007/PartnerControls">
+        <TermInfo xmlns="http://schemas.microsoft.com/office/infopath/2007/PartnerControls">
+          <TermName xmlns="http://schemas.microsoft.com/office/infopath/2007/PartnerControls">Microsoft Build 2016</TermName>
+          <TermId xmlns="http://schemas.microsoft.com/office/infopath/2007/PartnerControls">da8a10b5-9bc3-4217-80aa-6b60d6ec1cee</TermId>
+        </TermInfo>
+      </Terms>
+    </TaxKeywordTaxHTField>
+    <TaxCatchAll xmlns="230e9df3-be65-4c73-a93b-d1236ebd677e">
+      <Value>48</Value>
+      <Value>47</Value>
+      <Value>46</Value>
+      <Value>49</Value>
+    </TaxCatchAll>
+    <NumberofDownloads xmlns="230e9df3-be65-4c73-a93b-d1236ebd677e" xsi:nil="true"/>
+    <_ip_UnifiedCompliancePolicyUIAction xmlns="http://schemas.microsoft.com/sharepoint/v3" xsi:nil="true"/>
+    <_ip_UnifiedCompliancePolicyProperties xmlns="http://schemas.microsoft.com/sharepoint/v3" xsi:nil="true"/>
+  </documentManagement>
+</p:properties>
+</file>
+
+<file path=customXml/item2.xml><?xml version="1.0" encoding="utf-8"?>
+<?mso-contentType ?>
+<FormTemplates xmlns="http://schemas.microsoft.com/sharepoint/v3/contenttype/forms">
+  <Display>DocumentLibraryForm</Display>
+  <Edit>DocumentLibraryForm</Edit>
+  <New>DocumentLibraryForm</New>
+</FormTemplates>
+</file>
+
+<file path=customXml/item3.xml><?xml version="1.0" encoding="utf-8"?>
 <ct:contentTypeSchema xmlns:ct="http://schemas.microsoft.com/office/2006/metadata/contentType" xmlns:ma="http://schemas.microsoft.com/office/2006/metadata/properties/metaAttributes" ct:_="" ma:_="" ma:contentTypeName="PresentationsDoc" ma:contentTypeID="0x01010031DCF4CA090F824DB1E4CCBB6B9D64EA00101E8AAD132F8F4D96340D6376C8BB3E" ma:contentTypeVersion="26" ma:contentTypeDescription="" ma:contentTypeScope="" ma:versionID="637d2002f1ba4164d39fe098da629583">
   <xsd:schema xmlns:xsd="http://www.w3.org/2001/XMLSchema" xmlns:xs="http://www.w3.org/2001/XMLSchema" xmlns:p="http://schemas.microsoft.com/office/2006/metadata/properties" xmlns:ns1="http://schemas.microsoft.com/sharepoint/v3" xmlns:ns2="01c77077-aee4-4b5f-bd4e-9cd40a6fff29" xmlns:ns3="230e9df3-be65-4c73-a93b-d1236ebd677e" xmlns:ns5="8ff673fc-3231-4e3a-893b-6d7f7cd32766" targetNamespace="http://schemas.microsoft.com/office/2006/metadata/properties" ma:root="true" ma:fieldsID="3017d9e36cc87838c67006ed06be3b3f" ns1:_="" ns2:_="" ns3:_="" ns5:_="">
     <xsd:import namespace="http://schemas.microsoft.com/sharepoint/v3"/>
@@ -26136,97 +26432,34 @@
 </ct:contentTypeSchema>
 </file>
 
-<file path=customXml/item2.xml><?xml version="1.0" encoding="utf-8"?>
-<?mso-contentType ?>
-<FormTemplates xmlns="http://schemas.microsoft.com/sharepoint/v3/contenttype/forms">
-  <Display>DocumentLibraryForm</Display>
-  <Edit>DocumentLibraryForm</Edit>
-  <New>DocumentLibraryForm</New>
-</FormTemplates>
+<file path=customXml/itemProps1.xml><?xml version="1.0" encoding="utf-8"?>
+<ds:datastoreItem xmlns:ds="http://schemas.openxmlformats.org/officeDocument/2006/customXml" ds:itemID="{F990F116-B58F-4255-B05B-DA3808E0E5C6}">
+  <ds:schemaRefs>
+    <ds:schemaRef ds:uri="http://schemas.microsoft.com/sharepoint/v3"/>
+    <ds:schemaRef ds:uri="230e9df3-be65-4c73-a93b-d1236ebd677e"/>
+    <ds:schemaRef ds:uri="01c77077-aee4-4b5f-bd4e-9cd40a6fff29"/>
+    <ds:schemaRef ds:uri="http://purl.org/dc/terms/"/>
+    <ds:schemaRef ds:uri="http://schemas.microsoft.com/office/infopath/2007/PartnerControls"/>
+    <ds:schemaRef ds:uri="http://schemas.microsoft.com/office/2006/documentManagement/types"/>
+    <ds:schemaRef ds:uri="http://schemas.microsoft.com/office/2006/metadata/properties"/>
+    <ds:schemaRef ds:uri="http://purl.org/dc/elements/1.1/"/>
+    <ds:schemaRef ds:uri="http://schemas.openxmlformats.org/package/2006/metadata/core-properties"/>
+    <ds:schemaRef ds:uri="8ff673fc-3231-4e3a-893b-6d7f7cd32766"/>
+    <ds:schemaRef ds:uri="http://www.w3.org/XML/1998/namespace"/>
+    <ds:schemaRef ds:uri="http://purl.org/dc/dcmitype/"/>
+  </ds:schemaRefs>
+</ds:datastoreItem>
 </file>
 
-<file path=customXml/item3.xml><?xml version="1.0" encoding="utf-8"?>
-<p:properties xmlns:p="http://schemas.microsoft.com/office/2006/metadata/properties" xmlns:xsi="http://www.w3.org/2001/XMLSchema-instance" xmlns:pc="http://schemas.microsoft.com/office/infopath/2007/PartnerControls">
-  <documentManagement>
-    <LikesCount xmlns="http://schemas.microsoft.com/sharepoint/v3" xsi:nil="true"/>
-    <d12e2661e9634d9aa98bbb375f31aced xmlns="01c77077-aee4-4b5f-bd4e-9cd40a6fff29">
-      <Terms xmlns="http://schemas.microsoft.com/office/infopath/2007/PartnerControls">
-        <TermInfo xmlns="http://schemas.microsoft.com/office/infopath/2007/PartnerControls">
-          <TermName xmlns="http://schemas.microsoft.com/office/infopath/2007/PartnerControls">Moscone Center</TermName>
-          <TermId xmlns="http://schemas.microsoft.com/office/infopath/2007/PartnerControls">d4f36a2e-dd0d-4424-990f-7c93b4e9f063</TermId>
-        </TermInfo>
-      </Terms>
-    </d12e2661e9634d9aa98bbb375f31aced>
-    <Event_x0020_Start_x0020_Date xmlns="01c77077-aee4-4b5f-bd4e-9cd40a6fff29">2016-03-30T07:00:00+00:00</Event_x0020_Start_x0020_Date>
-    <Target_x0020_Audiences xmlns="8ff673fc-3231-4e3a-893b-6d7f7cd32766" xsi:nil="true"/>
-    <iaa5f83406f94009a0f6a3e890699ff7 xmlns="01c77077-aee4-4b5f-bd4e-9cd40a6fff29">
-      <Terms xmlns="http://schemas.microsoft.com/office/infopath/2007/PartnerControls">
-        <TermInfo xmlns="http://schemas.microsoft.com/office/infopath/2007/PartnerControls">
-          <TermName xmlns="http://schemas.microsoft.com/office/infopath/2007/PartnerControls">San Francisco</TermName>
-          <TermId xmlns="http://schemas.microsoft.com/office/infopath/2007/PartnerControls">84dfcb53-432b-499d-8965-93d483d36b4a</TermId>
-        </TermInfo>
-      </Terms>
-    </iaa5f83406f94009a0f6a3e890699ff7>
-    <External_x0020_Speaker xmlns="01c77077-aee4-4b5f-bd4e-9cd40a6fff29" xsi:nil="true"/>
-    <m6878b9dd7994da4ba144f95347d99c6 xmlns="01c77077-aee4-4b5f-bd4e-9cd40a6fff29">
-      <Terms xmlns="http://schemas.microsoft.com/office/infopath/2007/PartnerControls"/>
-    </m6878b9dd7994da4ba144f95347d99c6>
-    <Presentation_x0020_Date xmlns="01c77077-aee4-4b5f-bd4e-9cd40a6fff29" xsi:nil="true"/>
-    <fc15c16204564de583b4c942b10d19ec xmlns="01c77077-aee4-4b5f-bd4e-9cd40a6fff29">
-      <Terms xmlns="http://schemas.microsoft.com/office/infopath/2007/PartnerControls"/>
-    </fc15c16204564de583b4c942b10d19ec>
-    <mb2e01f7e2d8413988e28e59aa226eec xmlns="01c77077-aee4-4b5f-bd4e-9cd40a6fff29">
-      <Terms xmlns="http://schemas.microsoft.com/office/infopath/2007/PartnerControls">
-        <TermInfo xmlns="http://schemas.microsoft.com/office/infopath/2007/PartnerControls">
-          <TermName xmlns="http://schemas.microsoft.com/office/infopath/2007/PartnerControls">Build</TermName>
-          <TermId xmlns="http://schemas.microsoft.com/office/infopath/2007/PartnerControls">58542b36-5bf5-46a6-a53f-a41fb7a73785</TermId>
-        </TermInfo>
-      </Terms>
-    </mb2e01f7e2d8413988e28e59aa226eec>
-    <MS_x0020_Content_x0020_Owner xmlns="01c77077-aee4-4b5f-bd4e-9cd40a6fff29">
-      <UserInfo>
-        <DisplayName/>
-        <AccountId xsi:nil="true"/>
-        <AccountType/>
-      </UserInfo>
-    </MS_x0020_Content_x0020_Owner>
-    <Session_x0020_Code xmlns="01c77077-aee4-4b5f-bd4e-9cd40a6fff29" xsi:nil="true"/>
-    <Event_x0020_End_x0020_Date xmlns="01c77077-aee4-4b5f-bd4e-9cd40a6fff29">2016-04-01T07:00:00+00:00</Event_x0020_End_x0020_Date>
-    <o1010385baed4da9b5076a6aa651d1e5 xmlns="01c77077-aee4-4b5f-bd4e-9cd40a6fff29">
-      <Terms xmlns="http://schemas.microsoft.com/office/infopath/2007/PartnerControls"/>
-    </o1010385baed4da9b5076a6aa651d1e5>
-    <kc6d1bd9a46e4e5fbbbf99ca3de7a092 xmlns="01c77077-aee4-4b5f-bd4e-9cd40a6fff29">
-      <Terms xmlns="http://schemas.microsoft.com/office/infopath/2007/PartnerControls"/>
-    </kc6d1bd9a46e4e5fbbbf99ca3de7a092>
-    <MS_x0020_Speaker xmlns="01c77077-aee4-4b5f-bd4e-9cd40a6fff29">
-      <UserInfo>
-        <DisplayName/>
-        <AccountId xsi:nil="true"/>
-        <AccountType/>
-      </UserInfo>
-    </MS_x0020_Speaker>
-    <TaxKeywordTaxHTField xmlns="230e9df3-be65-4c73-a93b-d1236ebd677e">
-      <Terms xmlns="http://schemas.microsoft.com/office/infopath/2007/PartnerControls">
-        <TermInfo xmlns="http://schemas.microsoft.com/office/infopath/2007/PartnerControls">
-          <TermName xmlns="http://schemas.microsoft.com/office/infopath/2007/PartnerControls">Microsoft Build 2016</TermName>
-          <TermId xmlns="http://schemas.microsoft.com/office/infopath/2007/PartnerControls">da8a10b5-9bc3-4217-80aa-6b60d6ec1cee</TermId>
-        </TermInfo>
-      </Terms>
-    </TaxKeywordTaxHTField>
-    <TaxCatchAll xmlns="230e9df3-be65-4c73-a93b-d1236ebd677e">
-      <Value>48</Value>
-      <Value>47</Value>
-      <Value>46</Value>
-      <Value>49</Value>
-    </TaxCatchAll>
-    <NumberofDownloads xmlns="230e9df3-be65-4c73-a93b-d1236ebd677e" xsi:nil="true"/>
-    <_ip_UnifiedCompliancePolicyUIAction xmlns="http://schemas.microsoft.com/sharepoint/v3" xsi:nil="true"/>
-    <_ip_UnifiedCompliancePolicyProperties xmlns="http://schemas.microsoft.com/sharepoint/v3" xsi:nil="true"/>
-  </documentManagement>
-</p:properties>
+<file path=customXml/itemProps2.xml><?xml version="1.0" encoding="utf-8"?>
+<ds:datastoreItem xmlns:ds="http://schemas.openxmlformats.org/officeDocument/2006/customXml" ds:itemID="{758FDAC0-319D-4A54-8D8E-1D42CB1F8004}">
+  <ds:schemaRefs>
+    <ds:schemaRef ds:uri="http://schemas.microsoft.com/sharepoint/v3/contenttype/forms"/>
+  </ds:schemaRefs>
+</ds:datastoreItem>
 </file>
 
-<file path=customXml/itemProps1.xml><?xml version="1.0" encoding="utf-8"?>
+<file path=customXml/itemProps3.xml><?xml version="1.0" encoding="utf-8"?>
 <ds:datastoreItem xmlns:ds="http://schemas.openxmlformats.org/officeDocument/2006/customXml" ds:itemID="{DC1FDA5B-0E88-4BFF-BA4D-5ECB6C5776B2}">
   <ds:schemaRefs>
     <ds:schemaRef ds:uri="http://schemas.microsoft.com/office/2006/metadata/contentType"/>
@@ -26245,31 +26478,4 @@
     <ds:schemaRef ds:uri="http://schemas.microsoft.com/internal/obd"/>
   </ds:schemaRefs>
 </ds:datastoreItem>
-</file>
-
-<file path=customXml/itemProps2.xml><?xml version="1.0" encoding="utf-8"?>
-<ds:datastoreItem xmlns:ds="http://schemas.openxmlformats.org/officeDocument/2006/customXml" ds:itemID="{758FDAC0-319D-4A54-8D8E-1D42CB1F8004}">
-  <ds:schemaRefs>
-    <ds:schemaRef ds:uri="http://schemas.microsoft.com/sharepoint/v3/contenttype/forms"/>
-  </ds:schemaRefs>
-</ds:datastoreItem>
-</file>
-
-<file path=customXml/itemProps3.xml><?xml version="1.0" encoding="utf-8"?>
-<ds:datastoreItem xmlns:ds="http://schemas.openxmlformats.org/officeDocument/2006/customXml" ds:itemID="{F990F116-B58F-4255-B05B-DA3808E0E5C6}">
-  <ds:schemaRefs>
-    <ds:schemaRef ds:uri="http://schemas.microsoft.com/sharepoint/v3"/>
-    <ds:schemaRef ds:uri="230e9df3-be65-4c73-a93b-d1236ebd677e"/>
-    <ds:schemaRef ds:uri="01c77077-aee4-4b5f-bd4e-9cd40a6fff29"/>
-    <ds:schemaRef ds:uri="http://purl.org/dc/terms/"/>
-    <ds:schemaRef ds:uri="http://schemas.microsoft.com/office/infopath/2007/PartnerControls"/>
-    <ds:schemaRef ds:uri="http://schemas.microsoft.com/office/2006/documentManagement/types"/>
-    <ds:schemaRef ds:uri="http://schemas.microsoft.com/office/2006/metadata/properties"/>
-    <ds:schemaRef ds:uri="http://purl.org/dc/elements/1.1/"/>
-    <ds:schemaRef ds:uri="http://schemas.openxmlformats.org/package/2006/metadata/core-properties"/>
-    <ds:schemaRef ds:uri="8ff673fc-3231-4e3a-893b-6d7f7cd32766"/>
-    <ds:schemaRef ds:uri="http://www.w3.org/XML/1998/namespace"/>
-    <ds:schemaRef ds:uri="http://purl.org/dc/dcmitype/"/>
-  </ds:schemaRefs>
-</ds:datastoreItem>
 </file>
</xml_diff>

<commit_message>
final updates before devup intro to service fabric presentation
</commit_message>
<xml_diff>
--- a/Presentations/Service Fabric/ServiceFabric Beyond Hello Workshop.pptx
+++ b/Presentations/Service Fabric/ServiceFabric Beyond Hello Workshop.pptx
@@ -302,7 +302,7 @@
               <a:rPr lang="en-US" smtClean="0">
                 <a:latin typeface="Segoe UI" pitchFamily="34" charset="0"/>
               </a:rPr>
-              <a:t>10/20/2016 11:44 AM</a:t>
+              <a:t>10/20/2016 4:45 PM</a:t>
             </a:fld>
             <a:endParaRPr lang="en-US" dirty="0">
               <a:latin typeface="Segoe UI" pitchFamily="34" charset="0"/>
@@ -646,7 +646,7 @@
           <a:p>
             <a:fld id="{38EEC551-8CDA-4EB6-89BB-2A86C9F091C8}" type="datetime8">
               <a:rPr lang="en-US" smtClean="0"/>
-              <a:t>10/20/2016 11:44 AM</a:t>
+              <a:t>10/20/2016 4:45 PM</a:t>
             </a:fld>
             <a:endParaRPr lang="en-US" dirty="0"/>
           </a:p>
@@ -1036,7 +1036,7 @@
           <a:p>
             <a:fld id="{38EEC551-8CDA-4EB6-89BB-2A86C9F091C8}" type="datetime8">
               <a:rPr lang="en-US" smtClean="0"/>
-              <a:t>10/20/2016 11:44 AM</a:t>
+              <a:t>10/20/2016 4:45 PM</a:t>
             </a:fld>
             <a:endParaRPr lang="en-US" dirty="0"/>
           </a:p>
@@ -1279,7 +1279,7 @@
           <a:p>
             <a:fld id="{6108602D-D426-4C00-B215-BFA18C076426}" type="datetime8">
               <a:rPr lang="en-US" smtClean="0"/>
-              <a:t>10/20/2016 11:44 AM</a:t>
+              <a:t>10/20/2016 4:45 PM</a:t>
             </a:fld>
             <a:endParaRPr lang="en-US" dirty="0"/>
           </a:p>
@@ -1667,7 +1667,7 @@
           <a:p>
             <a:fld id="{38EEC551-8CDA-4EB6-89BB-2A86C9F091C8}" type="datetime8">
               <a:rPr lang="en-US" smtClean="0"/>
-              <a:t>10/20/2016 11:44 AM</a:t>
+              <a:t>10/20/2016 4:45 PM</a:t>
             </a:fld>
             <a:endParaRPr lang="en-US" dirty="0"/>
           </a:p>
@@ -1921,7 +1921,7 @@
           <a:p>
             <a:fld id="{90EC29EE-A8AD-4CE0-9C0B-116E0D4D7533}" type="datetime8">
               <a:rPr lang="en-US" smtClean="0"/>
-              <a:t>10/20/2016 11:44 AM</a:t>
+              <a:t>10/20/2016 4:45 PM</a:t>
             </a:fld>
             <a:endParaRPr lang="en-US" dirty="0"/>
           </a:p>
@@ -2260,7 +2260,7 @@
                 <a:tabLst/>
                 <a:defRPr/>
               </a:pPr>
-              <a:t>10/20/2016 11:44 AM</a:t>
+              <a:t>10/20/2016 4:45 PM</a:t>
             </a:fld>
             <a:endParaRPr kumimoji="0" lang="en-US" sz="1800" b="0" i="0" u="none" strike="noStrike" kern="0" cap="none" spc="0" normalizeH="0" baseline="0" noProof="0" dirty="0">
               <a:ln>
@@ -2607,7 +2607,7 @@
                 <a:tabLst/>
                 <a:defRPr/>
               </a:pPr>
-              <a:t>10/20/2016 11:44 AM</a:t>
+              <a:t>10/20/2016 4:45 PM</a:t>
             </a:fld>
             <a:endParaRPr kumimoji="0" lang="en-US" sz="1800" b="0" i="0" u="none" strike="noStrike" kern="0" cap="none" spc="0" normalizeH="0" baseline="0" noProof="0" dirty="0">
               <a:ln>
@@ -2871,7 +2871,7 @@
           <a:p>
             <a:fld id="{38EEC551-8CDA-4EB6-89BB-2A86C9F091C8}" type="datetime8">
               <a:rPr lang="en-US" smtClean="0"/>
-              <a:t>10/20/2016 11:44 AM</a:t>
+              <a:t>10/20/2016 4:45 PM</a:t>
             </a:fld>
             <a:endParaRPr lang="en-US" dirty="0"/>
           </a:p>
@@ -2960,15 +2960,24 @@
           <a:p>
             <a:r>
               <a:rPr lang="en-US" dirty="0"/>
+              <a:t>https://azure.microsoft.com/en-us/documentation/articles/service-fabric-service-manifest-resources/</a:t>
+            </a:r>
+          </a:p>
+          <a:p>
+            <a:endParaRPr lang="en-US" dirty="0"/>
+          </a:p>
+          <a:p>
+            <a:r>
+              <a:rPr lang="en-US" dirty="0"/>
               <a:t>https://azure.microsoft.com/en-us/documentation/articles/service-fabric-connect-and-communicate-with-services/</a:t>
             </a:r>
           </a:p>
           <a:p>
-            <a:endParaRPr lang="en-US"/>
-          </a:p>
-          <a:p>
-            <a:r>
-              <a:rPr lang="en-US"/>
+            <a:endParaRPr lang="en-US" dirty="0"/>
+          </a:p>
+          <a:p>
+            <a:r>
+              <a:rPr lang="en-US" dirty="0"/>
               <a:t>https://azure.microsoft.com/en-us/documentation/articles/service-fabric-service-manifest-resources/</a:t>
             </a:r>
           </a:p>
@@ -3077,7 +3086,7 @@
           <a:p>
             <a:fld id="{38EEC551-8CDA-4EB6-89BB-2A86C9F091C8}" type="datetime8">
               <a:rPr lang="en-US" smtClean="0"/>
-              <a:t>10/20/2016 11:49 AM</a:t>
+              <a:t>10/20/2016 4:46 PM</a:t>
             </a:fld>
             <a:endParaRPr lang="en-US" dirty="0"/>
           </a:p>
@@ -3517,7 +3526,7 @@
           <a:p>
             <a:fld id="{38EEC551-8CDA-4EB6-89BB-2A86C9F091C8}" type="datetime8">
               <a:rPr lang="en-US" smtClean="0"/>
-              <a:t>10/20/2016 11:44 AM</a:t>
+              <a:t>10/20/2016 4:45 PM</a:t>
             </a:fld>
             <a:endParaRPr lang="en-US" dirty="0"/>
           </a:p>
@@ -25960,6 +25969,15 @@
 </file>
 
 <file path=customXml/item1.xml><?xml version="1.0" encoding="utf-8"?>
+<?mso-contentType ?>
+<FormTemplates xmlns="http://schemas.microsoft.com/sharepoint/v3/contenttype/forms">
+  <Display>DocumentLibraryForm</Display>
+  <Edit>DocumentLibraryForm</Edit>
+  <New>DocumentLibraryForm</New>
+</FormTemplates>
+</file>
+
+<file path=customXml/item2.xml><?xml version="1.0" encoding="utf-8"?>
 <p:properties xmlns:p="http://schemas.microsoft.com/office/2006/metadata/properties" xmlns:xsi="http://www.w3.org/2001/XMLSchema-instance" xmlns:pc="http://schemas.microsoft.com/office/infopath/2007/PartnerControls">
   <documentManagement>
     <LikesCount xmlns="http://schemas.microsoft.com/sharepoint/v3" xsi:nil="true"/>
@@ -26038,15 +26056,6 @@
     <_ip_UnifiedCompliancePolicyProperties xmlns="http://schemas.microsoft.com/sharepoint/v3" xsi:nil="true"/>
   </documentManagement>
 </p:properties>
-</file>
-
-<file path=customXml/item2.xml><?xml version="1.0" encoding="utf-8"?>
-<?mso-contentType ?>
-<FormTemplates xmlns="http://schemas.microsoft.com/sharepoint/v3/contenttype/forms">
-  <Display>DocumentLibraryForm</Display>
-  <Edit>DocumentLibraryForm</Edit>
-  <New>DocumentLibraryForm</New>
-</FormTemplates>
 </file>
 
 <file path=customXml/item3.xml><?xml version="1.0" encoding="utf-8"?>
@@ -26433,6 +26442,14 @@
 </file>
 
 <file path=customXml/itemProps1.xml><?xml version="1.0" encoding="utf-8"?>
+<ds:datastoreItem xmlns:ds="http://schemas.openxmlformats.org/officeDocument/2006/customXml" ds:itemID="{758FDAC0-319D-4A54-8D8E-1D42CB1F8004}">
+  <ds:schemaRefs>
+    <ds:schemaRef ds:uri="http://schemas.microsoft.com/sharepoint/v3/contenttype/forms"/>
+  </ds:schemaRefs>
+</ds:datastoreItem>
+</file>
+
+<file path=customXml/itemProps2.xml><?xml version="1.0" encoding="utf-8"?>
 <ds:datastoreItem xmlns:ds="http://schemas.openxmlformats.org/officeDocument/2006/customXml" ds:itemID="{F990F116-B58F-4255-B05B-DA3808E0E5C6}">
   <ds:schemaRefs>
     <ds:schemaRef ds:uri="http://schemas.microsoft.com/sharepoint/v3"/>
@@ -26447,14 +26464,6 @@
     <ds:schemaRef ds:uri="8ff673fc-3231-4e3a-893b-6d7f7cd32766"/>
     <ds:schemaRef ds:uri="http://www.w3.org/XML/1998/namespace"/>
     <ds:schemaRef ds:uri="http://purl.org/dc/dcmitype/"/>
-  </ds:schemaRefs>
-</ds:datastoreItem>
-</file>
-
-<file path=customXml/itemProps2.xml><?xml version="1.0" encoding="utf-8"?>
-<ds:datastoreItem xmlns:ds="http://schemas.openxmlformats.org/officeDocument/2006/customXml" ds:itemID="{758FDAC0-319D-4A54-8D8E-1D42CB1F8004}">
-  <ds:schemaRefs>
-    <ds:schemaRef ds:uri="http://schemas.microsoft.com/sharepoint/v3/contenttype/forms"/>
   </ds:schemaRefs>
 </ds:datastoreItem>
 </file>

</xml_diff>